<commit_message>
Upload revised slide 2 for pptx
</commit_message>
<xml_diff>
--- a/WCNPO Striped Marlin 07-May-2024.pptx
+++ b/WCNPO Striped Marlin 07-May-2024.pptx
@@ -10238,35 +10238,35 @@
           <a:p>
             <a:r>
               <a:rPr lang="en-US" dirty="0"/>
-              <a:t>This presentation is on BILLWG google drive at: </a:t>
+              <a:t>This presentation (WCNPO Striped Marlin 7-May-2024.pptx) is on BILLWG google drive at: </a:t>
             </a:r>
             <a:r>
               <a:rPr lang="en-US" dirty="0">
                 <a:hlinkClick r:id="rId2"/>
               </a:rPr>
-              <a:t>https:/</a:t>
-            </a:r>
+              <a:t>https://github.com/PIFSCstockassessments/2024-WCNPO-MLS-Rebuilding</a:t>
+            </a:r>
+            <a:r>
+              <a:rPr lang="en-US" dirty="0"/>
+              <a:t> </a:t>
+            </a:r>
+          </a:p>
+          <a:p>
             <a:endParaRPr lang="en-US" dirty="0"/>
+          </a:p>
+          <a:p>
+            <a:r>
+              <a:rPr lang="en-US" dirty="0"/>
+              <a:t>To access results, download GitHub repository</a:t>
+            </a:r>
           </a:p>
           <a:p>
             <a:pPr marL="0" indent="0">
               <a:buNone/>
             </a:pPr>
-            <a:endParaRPr lang="en-US" dirty="0"/>
-          </a:p>
-          <a:p>
-            <a:r>
-              <a:rPr lang="en-US" dirty="0"/>
-              <a:t>To access results, download GitHub repository</a:t>
-            </a:r>
-          </a:p>
-          <a:p>
-            <a:pPr marL="0" indent="0">
-              <a:buNone/>
-            </a:pPr>
             <a:r>
               <a:rPr lang="en-US" dirty="0">
-                <a:hlinkClick r:id="rId3"/>
+                <a:hlinkClick r:id="rId2"/>
               </a:rPr>
               <a:t>https://github.com/PIFSCstockassessments/2024-WCNPO-MLS-Rebuilding</a:t>
             </a:r>

</xml_diff>